<commit_message>
Final Version - Tableau
</commit_message>
<xml_diff>
--- a/PresentationSlide_DB.pptx
+++ b/PresentationSlide_DB.pptx
@@ -5,11 +5,12 @@
     <p:sldMasterId id="2147483660" r:id="rId1"/>
   </p:sldMasterIdLst>
   <p:notesMasterIdLst>
-    <p:notesMasterId r:id="rId4"/>
+    <p:notesMasterId r:id="rId5"/>
   </p:notesMasterIdLst>
   <p:sldIdLst>
     <p:sldId id="262" r:id="rId2"/>
     <p:sldId id="263" r:id="rId3"/>
+    <p:sldId id="264" r:id="rId4"/>
   </p:sldIdLst>
   <p:sldSz cx="12192000" cy="6858000"/>
   <p:notesSz cx="6858000" cy="9144000"/>
@@ -509,280 +510,6 @@
           <a:bodyPr/>
           <a:lstStyle/>
           <a:p>
-            <a:r>
-              <a:rPr lang="en-US" sz="1200" kern="1200" dirty="0">
-                <a:solidFill>
-                  <a:schemeClr val="tx1"/>
-                </a:solidFill>
-                <a:effectLst/>
-                <a:latin typeface="+mn-lt"/>
-                <a:ea typeface="+mn-ea"/>
-                <a:cs typeface="+mn-cs"/>
-              </a:rPr>
-              <a:t>Random Forest method is used to classify into classes and predict the mean (regression) of the each individual tree.</a:t>
-            </a:r>
-          </a:p>
-          <a:p>
-            <a:r>
-              <a:rPr lang="en-US" sz="1200" kern="1200" dirty="0">
-                <a:solidFill>
-                  <a:schemeClr val="tx1"/>
-                </a:solidFill>
-                <a:effectLst/>
-                <a:latin typeface="+mn-lt"/>
-                <a:ea typeface="+mn-ea"/>
-                <a:cs typeface="+mn-cs"/>
-              </a:rPr>
-              <a:t>We started with Base/Default model. The following steps were taken to create a final model.</a:t>
-            </a:r>
-          </a:p>
-          <a:p>
-            <a:pPr lvl="0"/>
-            <a:r>
-              <a:rPr lang="en-US" sz="1200" kern="1200" dirty="0">
-                <a:solidFill>
-                  <a:schemeClr val="tx1"/>
-                </a:solidFill>
-                <a:effectLst/>
-                <a:latin typeface="+mn-lt"/>
-                <a:ea typeface="+mn-ea"/>
-                <a:cs typeface="+mn-cs"/>
-              </a:rPr>
-              <a:t>The first step was to divide data into 'attributes' and 'label' sets. </a:t>
-            </a:r>
-          </a:p>
-          <a:p>
-            <a:pPr lvl="0"/>
-            <a:r>
-              <a:rPr lang="en-US" sz="1200" kern="1200" dirty="0">
-                <a:solidFill>
-                  <a:schemeClr val="tx1"/>
-                </a:solidFill>
-                <a:effectLst/>
-                <a:latin typeface="+mn-lt"/>
-                <a:ea typeface="+mn-ea"/>
-                <a:cs typeface="+mn-cs"/>
-              </a:rPr>
-              <a:t>The output data is then divided into training and test sets.</a:t>
-            </a:r>
-          </a:p>
-          <a:p>
-            <a:r>
-              <a:rPr lang="en-US" sz="1200" kern="1200" dirty="0">
-                <a:solidFill>
-                  <a:schemeClr val="tx1"/>
-                </a:solidFill>
-                <a:effectLst/>
-                <a:latin typeface="+mn-lt"/>
-                <a:ea typeface="+mn-ea"/>
-                <a:cs typeface="+mn-cs"/>
-              </a:rPr>
-              <a:t> Step 2: Tuning and train algorithm to solve regression problems via random forest</a:t>
-            </a:r>
-          </a:p>
-          <a:p>
-            <a:pPr lvl="0"/>
-            <a:r>
-              <a:rPr lang="en-US" sz="1200" kern="1200" dirty="0">
-                <a:solidFill>
-                  <a:schemeClr val="tx1"/>
-                </a:solidFill>
-                <a:effectLst/>
-                <a:latin typeface="+mn-lt"/>
-                <a:ea typeface="+mn-ea"/>
-                <a:cs typeface="+mn-cs"/>
-              </a:rPr>
-              <a:t>Tuned the model using the </a:t>
-            </a:r>
-            <a:r>
-              <a:rPr lang="en-US" sz="1200" kern="1200" dirty="0" err="1">
-                <a:solidFill>
-                  <a:schemeClr val="tx1"/>
-                </a:solidFill>
-                <a:effectLst/>
-                <a:latin typeface="+mn-lt"/>
-                <a:ea typeface="+mn-ea"/>
-                <a:cs typeface="+mn-cs"/>
-              </a:rPr>
-              <a:t>RandomForestRegressor</a:t>
-            </a:r>
-            <a:r>
-              <a:rPr lang="en-US" sz="1200" kern="1200" dirty="0">
-                <a:solidFill>
-                  <a:schemeClr val="tx1"/>
-                </a:solidFill>
-                <a:effectLst/>
-                <a:latin typeface="+mn-lt"/>
-                <a:ea typeface="+mn-ea"/>
-                <a:cs typeface="+mn-cs"/>
-              </a:rPr>
-              <a:t> class by adjusted </a:t>
-            </a:r>
-            <a:r>
-              <a:rPr lang="en-US" sz="1200" kern="1200" dirty="0" err="1">
-                <a:solidFill>
-                  <a:schemeClr val="tx1"/>
-                </a:solidFill>
-                <a:effectLst/>
-                <a:latin typeface="+mn-lt"/>
-                <a:ea typeface="+mn-ea"/>
-                <a:cs typeface="+mn-cs"/>
-              </a:rPr>
-              <a:t>n_estimators</a:t>
-            </a:r>
-            <a:r>
-              <a:rPr lang="en-US" sz="1200" kern="1200" dirty="0">
-                <a:solidFill>
-                  <a:schemeClr val="tx1"/>
-                </a:solidFill>
-                <a:effectLst/>
-                <a:latin typeface="+mn-lt"/>
-                <a:ea typeface="+mn-ea"/>
-                <a:cs typeface="+mn-cs"/>
-              </a:rPr>
-              <a:t> parameter.</a:t>
-            </a:r>
-          </a:p>
-          <a:p>
-            <a:pPr lvl="0"/>
-            <a:r>
-              <a:rPr lang="en-US" sz="1200" kern="1200" dirty="0">
-                <a:solidFill>
-                  <a:schemeClr val="tx1"/>
-                </a:solidFill>
-                <a:effectLst/>
-                <a:latin typeface="+mn-lt"/>
-                <a:ea typeface="+mn-ea"/>
-                <a:cs typeface="+mn-cs"/>
-              </a:rPr>
-              <a:t>This </a:t>
-            </a:r>
-            <a:r>
-              <a:rPr lang="en-US" sz="1200" kern="1200" dirty="0" err="1">
-                <a:solidFill>
-                  <a:schemeClr val="tx1"/>
-                </a:solidFill>
-                <a:effectLst/>
-                <a:latin typeface="+mn-lt"/>
-                <a:ea typeface="+mn-ea"/>
-                <a:cs typeface="+mn-cs"/>
-              </a:rPr>
-              <a:t>max_depth</a:t>
-            </a:r>
-            <a:r>
-              <a:rPr lang="en-US" sz="1200" kern="1200" dirty="0">
-                <a:solidFill>
-                  <a:schemeClr val="tx1"/>
-                </a:solidFill>
-                <a:effectLst/>
-                <a:latin typeface="+mn-lt"/>
-                <a:ea typeface="+mn-ea"/>
-                <a:cs typeface="+mn-cs"/>
-              </a:rPr>
-              <a:t> parameter defines the number of trees in the random forest. </a:t>
-            </a:r>
-          </a:p>
-          <a:p>
-            <a:r>
-              <a:rPr lang="en-US" sz="1200" kern="1200" dirty="0">
-                <a:solidFill>
-                  <a:schemeClr val="tx1"/>
-                </a:solidFill>
-                <a:effectLst/>
-                <a:latin typeface="+mn-lt"/>
-                <a:ea typeface="+mn-ea"/>
-                <a:cs typeface="+mn-cs"/>
-              </a:rPr>
-              <a:t>We started with base model and continue to fine tune the </a:t>
-            </a:r>
-            <a:r>
-              <a:rPr lang="en-US" sz="1200" kern="1200" dirty="0" err="1">
-                <a:solidFill>
-                  <a:schemeClr val="tx1"/>
-                </a:solidFill>
-                <a:effectLst/>
-                <a:latin typeface="+mn-lt"/>
-                <a:ea typeface="+mn-ea"/>
-                <a:cs typeface="+mn-cs"/>
-              </a:rPr>
-              <a:t>n_estimator</a:t>
-            </a:r>
-            <a:r>
-              <a:rPr lang="en-US" sz="1200" kern="1200" dirty="0">
-                <a:solidFill>
-                  <a:schemeClr val="tx1"/>
-                </a:solidFill>
-                <a:effectLst/>
-                <a:latin typeface="+mn-lt"/>
-                <a:ea typeface="+mn-ea"/>
-                <a:cs typeface="+mn-cs"/>
-              </a:rPr>
-              <a:t> by 20 and ended up with final tune of </a:t>
-            </a:r>
-            <a:r>
-              <a:rPr lang="en-US" sz="1200" kern="1200" dirty="0" err="1">
-                <a:solidFill>
-                  <a:schemeClr val="tx1"/>
-                </a:solidFill>
-                <a:effectLst/>
-                <a:latin typeface="+mn-lt"/>
-                <a:ea typeface="+mn-ea"/>
-                <a:cs typeface="+mn-cs"/>
-              </a:rPr>
-              <a:t>n_estimator</a:t>
-            </a:r>
-            <a:r>
-              <a:rPr lang="en-US" sz="1200" kern="1200" dirty="0">
-                <a:solidFill>
-                  <a:schemeClr val="tx1"/>
-                </a:solidFill>
-                <a:effectLst/>
-                <a:latin typeface="+mn-lt"/>
-                <a:ea typeface="+mn-ea"/>
-                <a:cs typeface="+mn-cs"/>
-              </a:rPr>
-              <a:t>=50 as there we no significant change when we increase n-estimator or </a:t>
-            </a:r>
-            <a:r>
-              <a:rPr lang="en-US" sz="1200" kern="1200" dirty="0" err="1">
-                <a:solidFill>
-                  <a:schemeClr val="tx1"/>
-                </a:solidFill>
-                <a:effectLst/>
-                <a:latin typeface="+mn-lt"/>
-                <a:ea typeface="+mn-ea"/>
-                <a:cs typeface="+mn-cs"/>
-              </a:rPr>
-              <a:t>max_depth</a:t>
-            </a:r>
-            <a:r>
-              <a:rPr lang="en-US" sz="1200" kern="1200" dirty="0">
-                <a:solidFill>
-                  <a:schemeClr val="tx1"/>
-                </a:solidFill>
-                <a:effectLst/>
-                <a:latin typeface="+mn-lt"/>
-                <a:ea typeface="+mn-ea"/>
-                <a:cs typeface="+mn-cs"/>
-              </a:rPr>
-              <a:t>.</a:t>
-            </a:r>
-          </a:p>
-          <a:p>
-            <a:r>
-              <a:rPr lang="en-US" sz="1200" kern="1200" dirty="0">
-                <a:solidFill>
-                  <a:schemeClr val="tx1"/>
-                </a:solidFill>
-                <a:effectLst/>
-                <a:latin typeface="+mn-lt"/>
-                <a:ea typeface="+mn-ea"/>
-                <a:cs typeface="+mn-cs"/>
-              </a:rPr>
-              <a:t>Advantages: </a:t>
-            </a:r>
-          </a:p>
-          <a:p>
             <a:pPr marL="0" marR="0" lvl="0" indent="0" algn="l" defTabSz="914400" rtl="0" eaLnBrk="1" fontAlgn="auto" latinLnBrk="0" hangingPunct="1">
               <a:lnSpc>
                 <a:spcPct val="100000"/>
@@ -800,20 +527,34 @@
               <a:tabLst/>
               <a:defRPr/>
             </a:pPr>
-            <a:r>
-              <a:rPr lang="en-US" sz="1200" kern="1200" dirty="0">
-                <a:solidFill>
-                  <a:schemeClr val="tx1"/>
-                </a:solidFill>
-                <a:effectLst/>
-                <a:latin typeface="+mn-lt"/>
-                <a:ea typeface="+mn-ea"/>
-                <a:cs typeface="+mn-cs"/>
-              </a:rPr>
-              <a:t>Random forest corrects for decision tree habit of overfitting to the training data. </a:t>
-            </a:r>
-          </a:p>
-          <a:p>
+            <a:endParaRPr lang="en-US" sz="1200" kern="1200" dirty="0">
+              <a:solidFill>
+                <a:schemeClr val="tx1"/>
+              </a:solidFill>
+              <a:effectLst/>
+              <a:latin typeface="+mn-lt"/>
+              <a:ea typeface="+mn-ea"/>
+              <a:cs typeface="+mn-cs"/>
+            </a:endParaRPr>
+          </a:p>
+          <a:p>
+            <a:pPr marL="0" marR="0" lvl="0" indent="0" algn="l" defTabSz="914400" rtl="0" eaLnBrk="1" fontAlgn="auto" latinLnBrk="0" hangingPunct="1">
+              <a:lnSpc>
+                <a:spcPct val="100000"/>
+              </a:lnSpc>
+              <a:spcBef>
+                <a:spcPts val="0"/>
+              </a:spcBef>
+              <a:spcAft>
+                <a:spcPts val="0"/>
+              </a:spcAft>
+              <a:buClrTx/>
+              <a:buSzTx/>
+              <a:buFontTx/>
+              <a:buNone/>
+              <a:tabLst/>
+              <a:defRPr/>
+            </a:pPr>
             <a:endParaRPr lang="en-US" dirty="0"/>
           </a:p>
         </p:txBody>
@@ -845,6 +586,90 @@
     <p:extLst>
       <p:ext uri="{BB962C8B-B14F-4D97-AF65-F5344CB8AC3E}">
         <p14:creationId xmlns:p14="http://schemas.microsoft.com/office/powerpoint/2010/main" val="2067897496"/>
+      </p:ext>
+    </p:extLst>
+  </p:cSld>
+  <p:clrMapOvr>
+    <a:masterClrMapping/>
+  </p:clrMapOvr>
+</p:notes>
+</file>
+
+<file path=ppt/notesSlides/notesSlide2.xml><?xml version="1.0" encoding="utf-8"?>
+<p:notes xmlns:a="http://schemas.openxmlformats.org/drawingml/2006/main" xmlns:r="http://schemas.openxmlformats.org/officeDocument/2006/relationships" xmlns:p="http://schemas.openxmlformats.org/presentationml/2006/main">
+  <p:cSld>
+    <p:spTree>
+      <p:nvGrpSpPr>
+        <p:cNvPr id="1" name=""/>
+        <p:cNvGrpSpPr/>
+        <p:nvPr/>
+      </p:nvGrpSpPr>
+      <p:grpSpPr>
+        <a:xfrm>
+          <a:off x="0" y="0"/>
+          <a:ext cx="0" cy="0"/>
+          <a:chOff x="0" y="0"/>
+          <a:chExt cx="0" cy="0"/>
+        </a:xfrm>
+      </p:grpSpPr>
+      <p:sp>
+        <p:nvSpPr>
+          <p:cNvPr id="2" name="Slide Image Placeholder 1"/>
+          <p:cNvSpPr>
+            <a:spLocks noGrp="1" noRot="1" noChangeAspect="1"/>
+          </p:cNvSpPr>
+          <p:nvPr>
+            <p:ph type="sldImg"/>
+          </p:nvPr>
+        </p:nvSpPr>
+        <p:spPr/>
+      </p:sp>
+      <p:sp>
+        <p:nvSpPr>
+          <p:cNvPr id="3" name="Notes Placeholder 2"/>
+          <p:cNvSpPr>
+            <a:spLocks noGrp="1"/>
+          </p:cNvSpPr>
+          <p:nvPr>
+            <p:ph type="body" idx="1"/>
+          </p:nvPr>
+        </p:nvSpPr>
+        <p:spPr/>
+        <p:txBody>
+          <a:bodyPr/>
+          <a:lstStyle/>
+          <a:p>
+            <a:endParaRPr lang="en-US" dirty="0"/>
+          </a:p>
+        </p:txBody>
+      </p:sp>
+      <p:sp>
+        <p:nvSpPr>
+          <p:cNvPr id="4" name="Slide Number Placeholder 3"/>
+          <p:cNvSpPr>
+            <a:spLocks noGrp="1"/>
+          </p:cNvSpPr>
+          <p:nvPr>
+            <p:ph type="sldNum" sz="quarter" idx="5"/>
+          </p:nvPr>
+        </p:nvSpPr>
+        <p:spPr/>
+        <p:txBody>
+          <a:bodyPr/>
+          <a:lstStyle/>
+          <a:p>
+            <a:fld id="{411C63C0-2ADB-44D4-A4AA-D8C1D40839B4}" type="slidenum">
+              <a:rPr lang="en-US" smtClean="0"/>
+              <a:t>2</a:t>
+            </a:fld>
+            <a:endParaRPr lang="en-US"/>
+          </a:p>
+        </p:txBody>
+      </p:sp>
+    </p:spTree>
+    <p:extLst>
+      <p:ext uri="{BB962C8B-B14F-4D97-AF65-F5344CB8AC3E}">
+        <p14:creationId xmlns:p14="http://schemas.microsoft.com/office/powerpoint/2010/main" val="1872810689"/>
       </p:ext>
     </p:extLst>
   </p:cSld>
@@ -7257,7 +7082,7 @@
           <p:nvPr>
             <p:extLst>
               <p:ext uri="{D42A27DB-BD31-4B8C-83A1-F6EECF244321}">
-                <p14:modId xmlns:p14="http://schemas.microsoft.com/office/powerpoint/2010/main" val="2056851938"/>
+                <p14:modId xmlns:p14="http://schemas.microsoft.com/office/powerpoint/2010/main" val="529226512"/>
               </p:ext>
             </p:extLst>
           </p:nvPr>
@@ -7537,7 +7362,7 @@
                     <a:p>
                       <a:r>
                         <a:rPr lang="en-US" sz="1200" dirty="0"/>
-                        <a:t>332.25</a:t>
+                        <a:t>334.30</a:t>
                       </a:r>
                     </a:p>
                   </a:txBody>
@@ -7576,7 +7401,7 @@
                     <a:p>
                       <a:r>
                         <a:rPr lang="en-US" sz="1200" dirty="0"/>
-                        <a:t>334.20</a:t>
+                        <a:t>334.51</a:t>
                       </a:r>
                     </a:p>
                   </a:txBody>
@@ -7613,7 +7438,7 @@
                     <a:p>
                       <a:r>
                         <a:rPr lang="en-US" sz="1200" dirty="0"/>
-                        <a:t>82.59%</a:t>
+                        <a:t>82.38%</a:t>
                       </a:r>
                     </a:p>
                   </a:txBody>
@@ -7652,7 +7477,7 @@
                     <a:p>
                       <a:r>
                         <a:rPr lang="en-US" sz="1200" dirty="0"/>
-                        <a:t>82.39%</a:t>
+                        <a:t>82.36%</a:t>
                       </a:r>
                     </a:p>
                   </a:txBody>
@@ -8029,7 +7854,7 @@
           <p:nvPr/>
         </p:nvPicPr>
         <p:blipFill>
-          <a:blip r:embed="rId2">
+          <a:blip r:embed="rId4">
             <a:extLst>
               <a:ext uri="{28A0092B-C50C-407E-A947-70E740481C1C}">
                 <a14:useLocalDpi xmlns:a14="http://schemas.microsoft.com/office/drawing/2010/main" val="0"/>
@@ -8042,18 +7867,560 @@
         </p:blipFill>
         <p:spPr>
           <a:xfrm>
-            <a:off x="206900" y="240031"/>
-            <a:ext cx="10456184" cy="6283324"/>
+            <a:off x="0" y="1554480"/>
+            <a:ext cx="8192692" cy="4510661"/>
           </a:xfrm>
           <a:prstGeom prst="rect">
             <a:avLst/>
           </a:prstGeom>
         </p:spPr>
       </p:pic>
+      <p:sp>
+        <p:nvSpPr>
+          <p:cNvPr id="2" name="TextBox 1">
+            <a:extLst>
+              <a:ext uri="{FF2B5EF4-FFF2-40B4-BE49-F238E27FC236}">
+                <a16:creationId xmlns:a16="http://schemas.microsoft.com/office/drawing/2014/main" id="{FD3E4D83-28DA-49D4-8593-30B4A5A1D9F8}"/>
+              </a:ext>
+            </a:extLst>
+          </p:cNvPr>
+          <p:cNvSpPr txBox="1"/>
+          <p:nvPr/>
+        </p:nvSpPr>
+        <p:spPr>
+          <a:xfrm>
+            <a:off x="5646420" y="2979420"/>
+            <a:ext cx="914400" cy="914400"/>
+          </a:xfrm>
+          <a:prstGeom prst="rect">
+            <a:avLst/>
+          </a:prstGeom>
+          <a:noFill/>
+        </p:spPr>
+        <p:txBody>
+          <a:bodyPr wrap="square" rtlCol="0">
+            <a:spAutoFit/>
+          </a:bodyPr>
+          <a:lstStyle/>
+          <a:p>
+            <a:endParaRPr lang="en-US" dirty="0"/>
+          </a:p>
+        </p:txBody>
+      </p:sp>
+      <p:sp>
+        <p:nvSpPr>
+          <p:cNvPr id="4" name="TextBox 3">
+            <a:extLst>
+              <a:ext uri="{FF2B5EF4-FFF2-40B4-BE49-F238E27FC236}">
+                <a16:creationId xmlns:a16="http://schemas.microsoft.com/office/drawing/2014/main" id="{7DF0CF34-B5CF-4C76-9FDC-CD12545E3A25}"/>
+              </a:ext>
+            </a:extLst>
+          </p:cNvPr>
+          <p:cNvSpPr txBox="1"/>
+          <p:nvPr/>
+        </p:nvSpPr>
+        <p:spPr>
+          <a:xfrm>
+            <a:off x="416333" y="792859"/>
+            <a:ext cx="8107680" cy="923330"/>
+          </a:xfrm>
+          <a:prstGeom prst="rect">
+            <a:avLst/>
+          </a:prstGeom>
+          <a:noFill/>
+        </p:spPr>
+        <p:txBody>
+          <a:bodyPr wrap="square" rtlCol="0">
+            <a:spAutoFit/>
+          </a:bodyPr>
+          <a:lstStyle/>
+          <a:p>
+            <a:r>
+              <a:rPr lang="en-US" dirty="0"/>
+              <a:t>Features importance is used to select features that have strong impact to the model (after training). Top 10 features that were key in the model prediction show a strong correlation to the TOTAL DOLLAR</a:t>
+            </a:r>
+          </a:p>
+        </p:txBody>
+      </p:sp>
+      <p:sp>
+        <p:nvSpPr>
+          <p:cNvPr id="6" name="Rectangle 1">
+            <a:extLst>
+              <a:ext uri="{FF2B5EF4-FFF2-40B4-BE49-F238E27FC236}">
+                <a16:creationId xmlns:a16="http://schemas.microsoft.com/office/drawing/2014/main" id="{4C27CCA9-7D2F-4438-8C75-FC348EA97D11}"/>
+              </a:ext>
+            </a:extLst>
+          </p:cNvPr>
+          <p:cNvSpPr>
+            <a:spLocks noChangeArrowheads="1"/>
+          </p:cNvSpPr>
+          <p:nvPr/>
+        </p:nvSpPr>
+        <p:spPr bwMode="auto">
+          <a:xfrm>
+            <a:off x="690716" y="89207"/>
+            <a:ext cx="8275320" cy="461665"/>
+          </a:xfrm>
+          <a:prstGeom prst="rect">
+            <a:avLst/>
+          </a:prstGeom>
+          <a:noFill/>
+          <a:ln>
+            <a:noFill/>
+          </a:ln>
+          <a:effectLst/>
+          <a:extLst>
+            <a:ext uri="{909E8E84-426E-40DD-AFC4-6F175D3DCCD1}">
+              <a14:hiddenFill xmlns:a14="http://schemas.microsoft.com/office/drawing/2010/main">
+                <a:solidFill>
+                  <a:schemeClr val="accent1"/>
+                </a:solidFill>
+              </a14:hiddenFill>
+            </a:ext>
+            <a:ext uri="{91240B29-F687-4F45-9708-019B960494DF}">
+              <a14:hiddenLine xmlns:a14="http://schemas.microsoft.com/office/drawing/2010/main" w="9525">
+                <a:solidFill>
+                  <a:schemeClr val="tx1"/>
+                </a:solidFill>
+                <a:miter lim="800000"/>
+                <a:headEnd/>
+                <a:tailEnd/>
+              </a14:hiddenLine>
+            </a:ext>
+            <a:ext uri="{AF507438-7753-43E0-B8FC-AC1667EBCBE1}">
+              <a14:hiddenEffects xmlns:a14="http://schemas.microsoft.com/office/drawing/2010/main">
+                <a:effectLst>
+                  <a:outerShdw dist="35921" dir="2700000" algn="ctr" rotWithShape="0">
+                    <a:schemeClr val="bg2"/>
+                  </a:outerShdw>
+                </a:effectLst>
+              </a14:hiddenEffects>
+            </a:ext>
+          </a:extLst>
+        </p:spPr>
+        <p:txBody>
+          <a:bodyPr vert="horz" wrap="square" lIns="91440" tIns="45720" rIns="91440" bIns="45720" numCol="1" anchor="ctr" anchorCtr="0" compatLnSpc="1">
+            <a:prstTxWarp prst="textNoShape">
+              <a:avLst/>
+            </a:prstTxWarp>
+            <a:spAutoFit/>
+          </a:bodyPr>
+          <a:lstStyle/>
+          <a:p>
+            <a:pPr marL="0" marR="0" lvl="0" indent="0" algn="l" defTabSz="914400" rtl="0" eaLnBrk="0" fontAlgn="base" latinLnBrk="0" hangingPunct="0">
+              <a:lnSpc>
+                <a:spcPct val="100000"/>
+              </a:lnSpc>
+              <a:spcBef>
+                <a:spcPct val="0"/>
+              </a:spcBef>
+              <a:spcAft>
+                <a:spcPct val="0"/>
+              </a:spcAft>
+              <a:buClrTx/>
+              <a:buSzTx/>
+              <a:buFontTx/>
+              <a:buNone/>
+              <a:tabLst/>
+            </a:pPr>
+            <a:r>
+              <a:rPr kumimoji="0" lang="en-US" altLang="en-US" sz="2400" b="0" i="0" u="none" strike="noStrike" cap="none" normalizeH="0" baseline="0" dirty="0">
+                <a:ln>
+                  <a:noFill/>
+                </a:ln>
+                <a:solidFill>
+                  <a:schemeClr val="tx1"/>
+                </a:solidFill>
+                <a:effectLst/>
+                <a:latin typeface="Arial" panose="020B0604020202020204" pitchFamily="34" charset="0"/>
+                <a:cs typeface="Arial" panose="020B0604020202020204" pitchFamily="34" charset="0"/>
+              </a:rPr>
+              <a:t>Feature </a:t>
+            </a:r>
+            <a:r>
+              <a:rPr lang="en-US" altLang="en-US" sz="2400" dirty="0" err="1">
+                <a:latin typeface="Arial" panose="020B0604020202020204" pitchFamily="34" charset="0"/>
+                <a:cs typeface="Arial" panose="020B0604020202020204" pitchFamily="34" charset="0"/>
+              </a:rPr>
+              <a:t>I</a:t>
+            </a:r>
+            <a:r>
+              <a:rPr kumimoji="0" lang="en-US" altLang="en-US" sz="2400" b="0" i="0" u="none" strike="noStrike" cap="none" normalizeH="0" baseline="0" dirty="0" err="1">
+                <a:ln>
+                  <a:noFill/>
+                </a:ln>
+                <a:solidFill>
+                  <a:schemeClr val="tx1"/>
+                </a:solidFill>
+                <a:effectLst/>
+                <a:latin typeface="Arial" panose="020B0604020202020204" pitchFamily="34" charset="0"/>
+                <a:cs typeface="Arial" panose="020B0604020202020204" pitchFamily="34" charset="0"/>
+              </a:rPr>
+              <a:t>mportances</a:t>
+            </a:r>
+            <a:r>
+              <a:rPr kumimoji="0" lang="en-US" altLang="en-US" sz="2400" b="0" i="0" u="none" strike="noStrike" cap="none" normalizeH="0" baseline="0" dirty="0">
+                <a:ln>
+                  <a:noFill/>
+                </a:ln>
+                <a:solidFill>
+                  <a:schemeClr val="tx1"/>
+                </a:solidFill>
+                <a:effectLst/>
+                <a:latin typeface="Arial" panose="020B0604020202020204" pitchFamily="34" charset="0"/>
+                <a:cs typeface="Arial" panose="020B0604020202020204" pitchFamily="34" charset="0"/>
+              </a:rPr>
+              <a:t> </a:t>
+            </a:r>
+          </a:p>
+        </p:txBody>
+      </p:sp>
+      <p:graphicFrame>
+        <p:nvGraphicFramePr>
+          <p:cNvPr id="11" name="Object 10">
+            <a:extLst>
+              <a:ext uri="{FF2B5EF4-FFF2-40B4-BE49-F238E27FC236}">
+                <a16:creationId xmlns:a16="http://schemas.microsoft.com/office/drawing/2014/main" id="{E2D55687-9E87-4D60-9C05-8D1ECB5600E3}"/>
+              </a:ext>
+            </a:extLst>
+          </p:cNvPr>
+          <p:cNvGraphicFramePr>
+            <a:graphicFrameLocks noChangeAspect="1"/>
+          </p:cNvGraphicFramePr>
+          <p:nvPr>
+            <p:extLst>
+              <p:ext uri="{D42A27DB-BD31-4B8C-83A1-F6EECF244321}">
+                <p14:modId xmlns:p14="http://schemas.microsoft.com/office/powerpoint/2010/main" val="4031452859"/>
+              </p:ext>
+            </p:extLst>
+          </p:nvPr>
+        </p:nvGraphicFramePr>
+        <p:xfrm>
+          <a:off x="8197608" y="1807813"/>
+          <a:ext cx="2457844" cy="4003993"/>
+        </p:xfrm>
+        <a:graphic>
+          <a:graphicData uri="http://schemas.openxmlformats.org/presentationml/2006/ole">
+            <mc:AlternateContent xmlns:mc="http://schemas.openxmlformats.org/markup-compatibility/2006">
+              <mc:Choice xmlns:v="urn:schemas-microsoft-com:vml" Requires="v">
+                <p:oleObj spid="_x0000_s1026" name="Worksheet" r:id="rId5" imgW="1463040" imgH="2384878" progId="Excel.Sheet.12">
+                  <p:embed/>
+                </p:oleObj>
+              </mc:Choice>
+              <mc:Fallback>
+                <p:oleObj name="Worksheet" r:id="rId5" imgW="1463040" imgH="2384878" progId="Excel.Sheet.12">
+                  <p:embed/>
+                  <p:pic>
+                    <p:nvPicPr>
+                      <p:cNvPr id="0" name=""/>
+                      <p:cNvPicPr/>
+                      <p:nvPr/>
+                    </p:nvPicPr>
+                    <p:blipFill>
+                      <a:blip r:embed="rId6"/>
+                      <a:stretch>
+                        <a:fillRect/>
+                      </a:stretch>
+                    </p:blipFill>
+                    <p:spPr>
+                      <a:xfrm>
+                        <a:off x="8197608" y="1807813"/>
+                        <a:ext cx="2457844" cy="4003993"/>
+                      </a:xfrm>
+                      <a:prstGeom prst="rect">
+                        <a:avLst/>
+                      </a:prstGeom>
+                    </p:spPr>
+                  </p:pic>
+                </p:oleObj>
+              </mc:Fallback>
+            </mc:AlternateContent>
+          </a:graphicData>
+        </a:graphic>
+      </p:graphicFrame>
     </p:spTree>
     <p:extLst>
       <p:ext uri="{BB962C8B-B14F-4D97-AF65-F5344CB8AC3E}">
         <p14:creationId xmlns:p14="http://schemas.microsoft.com/office/powerpoint/2010/main" val="1830224001"/>
+      </p:ext>
+    </p:extLst>
+  </p:cSld>
+  <p:clrMapOvr>
+    <a:masterClrMapping/>
+  </p:clrMapOvr>
+</p:sld>
+</file>
+
+<file path=ppt/slides/slide3.xml><?xml version="1.0" encoding="utf-8"?>
+<p:sld xmlns:a="http://schemas.openxmlformats.org/drawingml/2006/main" xmlns:r="http://schemas.openxmlformats.org/officeDocument/2006/relationships" xmlns:p="http://schemas.openxmlformats.org/presentationml/2006/main">
+  <p:cSld>
+    <p:spTree>
+      <p:nvGrpSpPr>
+        <p:cNvPr id="1" name=""/>
+        <p:cNvGrpSpPr/>
+        <p:nvPr/>
+      </p:nvGrpSpPr>
+      <p:grpSpPr>
+        <a:xfrm>
+          <a:off x="0" y="0"/>
+          <a:ext cx="0" cy="0"/>
+          <a:chOff x="0" y="0"/>
+          <a:chExt cx="0" cy="0"/>
+        </a:xfrm>
+      </p:grpSpPr>
+      <p:sp>
+        <p:nvSpPr>
+          <p:cNvPr id="2" name="Rectangle 1">
+            <a:extLst>
+              <a:ext uri="{FF2B5EF4-FFF2-40B4-BE49-F238E27FC236}">
+                <a16:creationId xmlns:a16="http://schemas.microsoft.com/office/drawing/2014/main" id="{DC698CF1-C80D-4432-8217-C970CAF4D11F}"/>
+              </a:ext>
+            </a:extLst>
+          </p:cNvPr>
+          <p:cNvSpPr/>
+          <p:nvPr/>
+        </p:nvSpPr>
+        <p:spPr>
+          <a:xfrm>
+            <a:off x="396240" y="853440"/>
+            <a:ext cx="11902440" cy="5693866"/>
+          </a:xfrm>
+          <a:prstGeom prst="rect">
+            <a:avLst/>
+          </a:prstGeom>
+        </p:spPr>
+        <p:txBody>
+          <a:bodyPr wrap="square">
+            <a:spAutoFit/>
+          </a:bodyPr>
+          <a:lstStyle/>
+          <a:p>
+            <a:pPr lvl="0" defTabSz="914400">
+              <a:defRPr/>
+            </a:pPr>
+            <a:r>
+              <a:rPr lang="en-US" sz="1400" b="1" dirty="0"/>
+              <a:t>What is Random Decision Forest</a:t>
+            </a:r>
+          </a:p>
+          <a:p>
+            <a:pPr lvl="0" defTabSz="914400">
+              <a:defRPr/>
+            </a:pPr>
+            <a:r>
+              <a:rPr lang="en-US" sz="1400" dirty="0"/>
+              <a:t>A random Forest algorithm comprises of random collection of decision trees. Random Forest algorithm does creates multiple decision trees  and merge them together to obtain a more robust/stable and accurate prediction. The more tree, the more robust the prediction and accuracy.</a:t>
+            </a:r>
+          </a:p>
+          <a:p>
+            <a:pPr lvl="0" defTabSz="914400">
+              <a:defRPr/>
+            </a:pPr>
+            <a:r>
+              <a:rPr lang="en-US" sz="1400" dirty="0"/>
+              <a:t>One interesting thing about Random Forest is that it can be used for both classification and regression algorithm. </a:t>
+            </a:r>
+          </a:p>
+          <a:p>
+            <a:r>
+              <a:rPr lang="en-US" sz="1400" b="1" dirty="0"/>
+              <a:t>Advantages/WHY </a:t>
+            </a:r>
+          </a:p>
+          <a:p>
+            <a:r>
+              <a:rPr lang="en-US" sz="1400" dirty="0"/>
+              <a:t>Random forest algorithm can be used for both classifications and regression task.</a:t>
+            </a:r>
+          </a:p>
+          <a:p>
+            <a:r>
+              <a:rPr lang="en-US" sz="1400" dirty="0"/>
+              <a:t>It provides higher accuracy.</a:t>
+            </a:r>
+          </a:p>
+          <a:p>
+            <a:r>
+              <a:rPr lang="en-US" sz="1400" dirty="0"/>
+              <a:t>Random forest classifier will handle the missing values and maintain the accuracy of a large proportion of data.</a:t>
+            </a:r>
+          </a:p>
+          <a:p>
+            <a:pPr lvl="0" defTabSz="914400">
+              <a:defRPr/>
+            </a:pPr>
+            <a:r>
+              <a:rPr lang="en-US" sz="1400" dirty="0"/>
+              <a:t>If there are more trees, it won’t allow overfitting trees in the model (Random forest corrects for decision tree habit of overfitting to the training data) </a:t>
+            </a:r>
+          </a:p>
+          <a:p>
+            <a:r>
+              <a:rPr lang="en-US" sz="1400" dirty="0"/>
+              <a:t>It has the power to handle a large data set with higher dimensionality.</a:t>
+            </a:r>
+          </a:p>
+          <a:p>
+            <a:r>
+              <a:rPr lang="en-US" sz="1400" b="1" dirty="0"/>
+              <a:t>Disadvantage:</a:t>
+            </a:r>
+          </a:p>
+          <a:p>
+            <a:r>
+              <a:rPr lang="en-US" sz="1400" dirty="0"/>
+              <a:t>With correlated features, strong features can end up with low scores and the method can be biased towards variables with many categories</a:t>
+            </a:r>
+          </a:p>
+          <a:p>
+            <a:pPr lvl="0" defTabSz="914400">
+              <a:defRPr/>
+            </a:pPr>
+            <a:endParaRPr lang="en-US" sz="1400" dirty="0"/>
+          </a:p>
+          <a:p>
+            <a:pPr lvl="0" defTabSz="914400">
+              <a:defRPr/>
+            </a:pPr>
+            <a:r>
+              <a:rPr lang="en-US" sz="1400" b="1" dirty="0"/>
+              <a:t>Our Approach </a:t>
+            </a:r>
+          </a:p>
+          <a:p>
+            <a:r>
+              <a:rPr lang="en-US" sz="1400" dirty="0"/>
+              <a:t>We started with Base/Default algorithm/model. The following steps were taken to create a final model.</a:t>
+            </a:r>
+          </a:p>
+          <a:p>
+            <a:pPr lvl="0"/>
+            <a:r>
+              <a:rPr lang="en-US" sz="1400" dirty="0"/>
+              <a:t>Step 1: The data was divided into 'attributes' and 'label' sets.</a:t>
+            </a:r>
+          </a:p>
+          <a:p>
+            <a:pPr lvl="0"/>
+            <a:r>
+              <a:rPr lang="en-US" sz="1400" dirty="0"/>
+              <a:t>             The output data is then divided into training and test sets.</a:t>
+            </a:r>
+          </a:p>
+          <a:p>
+            <a:r>
+              <a:rPr lang="en-US" sz="1400" dirty="0"/>
+              <a:t> </a:t>
+            </a:r>
+            <a:r>
+              <a:rPr lang="en-US" sz="1400" b="1" dirty="0"/>
+              <a:t>Step 2: </a:t>
+            </a:r>
+            <a:r>
+              <a:rPr lang="en-US" sz="1400" dirty="0"/>
+              <a:t>Tuned the algorithm/model using the </a:t>
+            </a:r>
+            <a:r>
+              <a:rPr lang="en-US" sz="1400" dirty="0" err="1"/>
+              <a:t>RandomForestRegressor</a:t>
+            </a:r>
+            <a:r>
+              <a:rPr lang="en-US" sz="1400" dirty="0"/>
+              <a:t> by adjusted</a:t>
+            </a:r>
+            <a:r>
+              <a:rPr lang="en-US" sz="1400" b="1" dirty="0"/>
+              <a:t> </a:t>
+            </a:r>
+            <a:r>
+              <a:rPr lang="en-US" sz="1400" b="1" dirty="0" err="1"/>
+              <a:t>n_estimators</a:t>
+            </a:r>
+            <a:r>
+              <a:rPr lang="en-US" sz="1400" b="1" dirty="0"/>
+              <a:t> </a:t>
+            </a:r>
+            <a:r>
+              <a:rPr lang="en-US" sz="1400" dirty="0"/>
+              <a:t>parameter and </a:t>
+            </a:r>
+            <a:r>
+              <a:rPr lang="en-US" sz="1400" dirty="0" err="1"/>
+              <a:t>max_depth</a:t>
+            </a:r>
+            <a:r>
+              <a:rPr lang="en-US" sz="1400" dirty="0"/>
+              <a:t> or  number of decision Trees( nodes and subsets).</a:t>
+            </a:r>
+          </a:p>
+          <a:p>
+            <a:pPr lvl="0"/>
+            <a:r>
+              <a:rPr lang="en-US" sz="1400" dirty="0"/>
+              <a:t>This </a:t>
+            </a:r>
+            <a:r>
+              <a:rPr lang="en-US" sz="1400" dirty="0" err="1"/>
+              <a:t>max_depth</a:t>
+            </a:r>
+            <a:r>
+              <a:rPr lang="en-US" sz="1400" dirty="0"/>
+              <a:t> parameter defines the number of trees in the random forest. </a:t>
+            </a:r>
+          </a:p>
+          <a:p>
+            <a:r>
+              <a:rPr lang="en-US" sz="1400" dirty="0"/>
+              <a:t>We started with and algorithm/model to fine tune the </a:t>
+            </a:r>
+            <a:r>
+              <a:rPr lang="en-US" sz="1400" dirty="0" err="1"/>
+              <a:t>n_estimator</a:t>
+            </a:r>
+            <a:r>
+              <a:rPr lang="en-US" sz="1400" dirty="0"/>
+              <a:t> by 20 and ended up with final tune of </a:t>
+            </a:r>
+            <a:r>
+              <a:rPr lang="en-US" sz="1400" dirty="0" err="1"/>
+              <a:t>n_estimator</a:t>
+            </a:r>
+            <a:r>
+              <a:rPr lang="en-US" sz="1400" dirty="0"/>
+              <a:t>=50 as </a:t>
+            </a:r>
+            <a:r>
+              <a:rPr lang="en-US" sz="1400" dirty="0" err="1"/>
+              <a:t>thbase</a:t>
+            </a:r>
+            <a:r>
+              <a:rPr lang="en-US" sz="1400" dirty="0"/>
+              <a:t> model ere we no significant change when we increase n-estimator or </a:t>
+            </a:r>
+            <a:r>
+              <a:rPr lang="en-US" sz="1400" dirty="0" err="1"/>
+              <a:t>max_depth</a:t>
+            </a:r>
+            <a:r>
+              <a:rPr lang="en-US" sz="1400" dirty="0"/>
+              <a:t>.</a:t>
+            </a:r>
+          </a:p>
+          <a:p>
+            <a:endParaRPr lang="en-US" sz="1400" dirty="0"/>
+          </a:p>
+          <a:p>
+            <a:endParaRPr lang="en-US" sz="1400" dirty="0"/>
+          </a:p>
+          <a:p>
+            <a:endParaRPr lang="en-US" sz="1400" dirty="0"/>
+          </a:p>
+        </p:txBody>
+      </p:sp>
+    </p:spTree>
+    <p:extLst>
+      <p:ext uri="{BB962C8B-B14F-4D97-AF65-F5344CB8AC3E}">
+        <p14:creationId xmlns:p14="http://schemas.microsoft.com/office/powerpoint/2010/main" val="2198182449"/>
       </p:ext>
     </p:extLst>
   </p:cSld>

</xml_diff>